<commit_message>
derniere maj avant soutenance
</commit_message>
<xml_diff>
--- a/documentation/Projet 3.pptx
+++ b/documentation/Projet 3.pptx
@@ -9,12 +9,14 @@
     <p:sldId id="257" r:id="rId3"/>
     <p:sldId id="258" r:id="rId4"/>
     <p:sldId id="259" r:id="rId5"/>
-    <p:sldId id="260" r:id="rId6"/>
-    <p:sldId id="261" r:id="rId7"/>
-    <p:sldId id="265" r:id="rId8"/>
-    <p:sldId id="262" r:id="rId9"/>
-    <p:sldId id="263" r:id="rId10"/>
-    <p:sldId id="264" r:id="rId11"/>
+    <p:sldId id="266" r:id="rId6"/>
+    <p:sldId id="260" r:id="rId7"/>
+    <p:sldId id="261" r:id="rId8"/>
+    <p:sldId id="265" r:id="rId9"/>
+    <p:sldId id="262" r:id="rId10"/>
+    <p:sldId id="263" r:id="rId11"/>
+    <p:sldId id="267" r:id="rId12"/>
+    <p:sldId id="264" r:id="rId13"/>
   </p:sldIdLst>
   <p:sldSz cx="9144000" cy="6858000" type="screen4x3"/>
   <p:notesSz cx="6858000" cy="9144000"/>
@@ -250,7 +252,7 @@
           <a:p>
             <a:fld id="{2082C536-9456-436B-BF7B-07A4248B044E}" type="datetimeFigureOut">
               <a:rPr lang="fr-FR" smtClean="0"/>
-              <a:t>02/11/2017</a:t>
+              <a:t>04/12/2017</a:t>
             </a:fld>
             <a:endParaRPr lang="fr-FR"/>
           </a:p>
@@ -563,7 +565,7 @@
           <a:p>
             <a:fld id="{2082C536-9456-436B-BF7B-07A4248B044E}" type="datetimeFigureOut">
               <a:rPr lang="fr-FR" smtClean="0"/>
-              <a:t>02/11/2017</a:t>
+              <a:t>04/12/2017</a:t>
             </a:fld>
             <a:endParaRPr lang="fr-FR"/>
           </a:p>
@@ -748,7 +750,7 @@
           <a:p>
             <a:fld id="{2082C536-9456-436B-BF7B-07A4248B044E}" type="datetimeFigureOut">
               <a:rPr lang="fr-FR" smtClean="0"/>
-              <a:t>02/11/2017</a:t>
+              <a:t>04/12/2017</a:t>
             </a:fld>
             <a:endParaRPr lang="fr-FR"/>
           </a:p>
@@ -923,7 +925,7 @@
           <a:p>
             <a:fld id="{2082C536-9456-436B-BF7B-07A4248B044E}" type="datetimeFigureOut">
               <a:rPr lang="fr-FR" smtClean="0"/>
-              <a:t>02/11/2017</a:t>
+              <a:t>04/12/2017</a:t>
             </a:fld>
             <a:endParaRPr lang="fr-FR"/>
           </a:p>
@@ -1191,7 +1193,7 @@
           <a:p>
             <a:fld id="{2082C536-9456-436B-BF7B-07A4248B044E}" type="datetimeFigureOut">
               <a:rPr lang="fr-FR" smtClean="0"/>
-              <a:t>02/11/2017</a:t>
+              <a:t>04/12/2017</a:t>
             </a:fld>
             <a:endParaRPr lang="fr-FR"/>
           </a:p>
@@ -1659,7 +1661,7 @@
           <a:p>
             <a:fld id="{2082C536-9456-436B-BF7B-07A4248B044E}" type="datetimeFigureOut">
               <a:rPr lang="fr-FR" smtClean="0"/>
-              <a:t>02/11/2017</a:t>
+              <a:t>04/12/2017</a:t>
             </a:fld>
             <a:endParaRPr lang="fr-FR"/>
           </a:p>
@@ -2148,7 +2150,7 @@
           <a:p>
             <a:fld id="{2082C536-9456-436B-BF7B-07A4248B044E}" type="datetimeFigureOut">
               <a:rPr lang="fr-FR" smtClean="0"/>
-              <a:t>02/11/2017</a:t>
+              <a:t>04/12/2017</a:t>
             </a:fld>
             <a:endParaRPr lang="fr-FR"/>
           </a:p>
@@ -2274,7 +2276,7 @@
           <a:p>
             <a:fld id="{2082C536-9456-436B-BF7B-07A4248B044E}" type="datetimeFigureOut">
               <a:rPr lang="fr-FR" smtClean="0"/>
-              <a:t>02/11/2017</a:t>
+              <a:t>04/12/2017</a:t>
             </a:fld>
             <a:endParaRPr lang="fr-FR"/>
           </a:p>
@@ -2418,7 +2420,7 @@
           <a:p>
             <a:fld id="{2082C536-9456-436B-BF7B-07A4248B044E}" type="datetimeFigureOut">
               <a:rPr lang="fr-FR" smtClean="0"/>
-              <a:t>02/11/2017</a:t>
+              <a:t>04/12/2017</a:t>
             </a:fld>
             <a:endParaRPr lang="fr-FR"/>
           </a:p>
@@ -2740,7 +2742,7 @@
           <a:p>
             <a:fld id="{2082C536-9456-436B-BF7B-07A4248B044E}" type="datetimeFigureOut">
               <a:rPr lang="fr-FR" smtClean="0"/>
-              <a:t>02/11/2017</a:t>
+              <a:t>04/12/2017</a:t>
             </a:fld>
             <a:endParaRPr lang="fr-FR"/>
           </a:p>
@@ -2874,7 +2876,7 @@
           <a:p>
             <a:fld id="{2082C536-9456-436B-BF7B-07A4248B044E}" type="datetimeFigureOut">
               <a:rPr lang="fr-FR" smtClean="0"/>
-              <a:t>02/11/2017</a:t>
+              <a:t>04/12/2017</a:t>
             </a:fld>
             <a:endParaRPr lang="fr-FR"/>
           </a:p>
@@ -3655,7 +3657,7 @@
           <a:p>
             <a:fld id="{2082C536-9456-436B-BF7B-07A4248B044E}" type="datetimeFigureOut">
               <a:rPr lang="fr-FR" smtClean="0"/>
-              <a:t>02/11/2017</a:t>
+              <a:t>04/12/2017</a:t>
             </a:fld>
             <a:endParaRPr lang="fr-FR"/>
           </a:p>
@@ -4604,8 +4606,12 @@
           <a:lstStyle/>
           <a:p>
             <a:r>
+              <a:rPr lang="fr-FR" dirty="0" smtClean="0"/>
+              <a:t>Evènements </a:t>
+            </a:r>
+            <a:r>
               <a:rPr lang="fr-FR" dirty="0"/>
-              <a:t>Conclusion et perspective d’évolution</a:t>
+              <a:t>gardien</a:t>
             </a:r>
             <a:br>
               <a:rPr lang="fr-FR" dirty="0"/>
@@ -4616,6 +4622,835 @@
       </p:sp>
       <p:sp>
         <p:nvSpPr>
+          <p:cNvPr id="6" name="ZoneTexte 5"/>
+          <p:cNvSpPr txBox="1"/>
+          <p:nvPr/>
+        </p:nvSpPr>
+        <p:spPr>
+          <a:xfrm>
+            <a:off x="2987824" y="1258172"/>
+            <a:ext cx="3528392" cy="369332"/>
+          </a:xfrm>
+          <a:prstGeom prst="rect">
+            <a:avLst/>
+          </a:prstGeom>
+          <a:noFill/>
+        </p:spPr>
+        <p:txBody>
+          <a:bodyPr wrap="square" rtlCol="0">
+            <a:spAutoFit/>
+          </a:bodyPr>
+          <a:lstStyle/>
+          <a:p>
+            <a:r>
+              <a:rPr lang="fr-FR" dirty="0" smtClean="0"/>
+              <a:t>1 er présentation  devant le gardien</a:t>
+            </a:r>
+            <a:endParaRPr lang="fr-FR" dirty="0"/>
+          </a:p>
+        </p:txBody>
+      </p:sp>
+      <p:sp>
+        <p:nvSpPr>
+          <p:cNvPr id="9" name="ZoneTexte 8"/>
+          <p:cNvSpPr txBox="1"/>
+          <p:nvPr/>
+        </p:nvSpPr>
+        <p:spPr>
+          <a:xfrm>
+            <a:off x="2850437" y="2996952"/>
+            <a:ext cx="3821360" cy="369332"/>
+          </a:xfrm>
+          <a:prstGeom prst="rect">
+            <a:avLst/>
+          </a:prstGeom>
+          <a:noFill/>
+        </p:spPr>
+        <p:txBody>
+          <a:bodyPr wrap="square" rtlCol="0">
+            <a:spAutoFit/>
+          </a:bodyPr>
+          <a:lstStyle/>
+          <a:p>
+            <a:r>
+              <a:rPr lang="fr-FR" dirty="0" smtClean="0"/>
+              <a:t>2 </a:t>
+            </a:r>
+            <a:r>
+              <a:rPr lang="fr-FR" dirty="0" err="1" smtClean="0"/>
+              <a:t>ième</a:t>
+            </a:r>
+            <a:r>
+              <a:rPr lang="fr-FR" dirty="0" smtClean="0"/>
+              <a:t> présentation  devant le gardien</a:t>
+            </a:r>
+            <a:endParaRPr lang="fr-FR" dirty="0"/>
+          </a:p>
+        </p:txBody>
+      </p:sp>
+      <p:sp>
+        <p:nvSpPr>
+          <p:cNvPr id="10" name="Rectangle 9"/>
+          <p:cNvSpPr/>
+          <p:nvPr/>
+        </p:nvSpPr>
+        <p:spPr>
+          <a:xfrm>
+            <a:off x="2957647" y="2021988"/>
+            <a:ext cx="1224136" cy="648072"/>
+          </a:xfrm>
+          <a:prstGeom prst="rect">
+            <a:avLst/>
+          </a:prstGeom>
+        </p:spPr>
+        <p:style>
+          <a:lnRef idx="2">
+            <a:schemeClr val="accent1">
+              <a:shade val="50000"/>
+            </a:schemeClr>
+          </a:lnRef>
+          <a:fillRef idx="1">
+            <a:schemeClr val="accent1"/>
+          </a:fillRef>
+          <a:effectRef idx="0">
+            <a:schemeClr val="accent1"/>
+          </a:effectRef>
+          <a:fontRef idx="minor">
+            <a:schemeClr val="lt1"/>
+          </a:fontRef>
+        </p:style>
+        <p:txBody>
+          <a:bodyPr rtlCol="0" anchor="ctr"/>
+          <a:lstStyle/>
+          <a:p>
+            <a:pPr algn="ctr"/>
+            <a:endParaRPr lang="fr-FR"/>
+          </a:p>
+        </p:txBody>
+      </p:sp>
+      <p:sp>
+        <p:nvSpPr>
+          <p:cNvPr id="11" name="Rectangle 10"/>
+          <p:cNvSpPr/>
+          <p:nvPr/>
+        </p:nvSpPr>
+        <p:spPr>
+          <a:xfrm>
+            <a:off x="5148064" y="2021988"/>
+            <a:ext cx="1224136" cy="648072"/>
+          </a:xfrm>
+          <a:prstGeom prst="rect">
+            <a:avLst/>
+          </a:prstGeom>
+        </p:spPr>
+        <p:style>
+          <a:lnRef idx="2">
+            <a:schemeClr val="accent1">
+              <a:shade val="50000"/>
+            </a:schemeClr>
+          </a:lnRef>
+          <a:fillRef idx="1">
+            <a:schemeClr val="accent1"/>
+          </a:fillRef>
+          <a:effectRef idx="0">
+            <a:schemeClr val="accent1"/>
+          </a:effectRef>
+          <a:fontRef idx="minor">
+            <a:schemeClr val="lt1"/>
+          </a:fontRef>
+        </p:style>
+        <p:txBody>
+          <a:bodyPr rtlCol="0" anchor="ctr"/>
+          <a:lstStyle/>
+          <a:p>
+            <a:pPr algn="ctr"/>
+            <a:endParaRPr lang="fr-FR"/>
+          </a:p>
+        </p:txBody>
+      </p:sp>
+      <p:sp>
+        <p:nvSpPr>
+          <p:cNvPr id="12" name="Rectangle 11"/>
+          <p:cNvSpPr/>
+          <p:nvPr/>
+        </p:nvSpPr>
+        <p:spPr>
+          <a:xfrm>
+            <a:off x="5335488" y="3565465"/>
+            <a:ext cx="1224136" cy="648072"/>
+          </a:xfrm>
+          <a:prstGeom prst="rect">
+            <a:avLst/>
+          </a:prstGeom>
+        </p:spPr>
+        <p:style>
+          <a:lnRef idx="2">
+            <a:schemeClr val="accent1">
+              <a:shade val="50000"/>
+            </a:schemeClr>
+          </a:lnRef>
+          <a:fillRef idx="1">
+            <a:schemeClr val="accent1"/>
+          </a:fillRef>
+          <a:effectRef idx="0">
+            <a:schemeClr val="accent1"/>
+          </a:effectRef>
+          <a:fontRef idx="minor">
+            <a:schemeClr val="lt1"/>
+          </a:fontRef>
+        </p:style>
+        <p:txBody>
+          <a:bodyPr rtlCol="0" anchor="ctr"/>
+          <a:lstStyle/>
+          <a:p>
+            <a:pPr algn="ctr"/>
+            <a:endParaRPr lang="fr-FR"/>
+          </a:p>
+        </p:txBody>
+      </p:sp>
+      <p:sp>
+        <p:nvSpPr>
+          <p:cNvPr id="13" name="Rectangle 12"/>
+          <p:cNvSpPr/>
+          <p:nvPr/>
+        </p:nvSpPr>
+        <p:spPr>
+          <a:xfrm>
+            <a:off x="3001144" y="3565465"/>
+            <a:ext cx="1224136" cy="648072"/>
+          </a:xfrm>
+          <a:prstGeom prst="rect">
+            <a:avLst/>
+          </a:prstGeom>
+        </p:spPr>
+        <p:style>
+          <a:lnRef idx="2">
+            <a:schemeClr val="accent1">
+              <a:shade val="50000"/>
+            </a:schemeClr>
+          </a:lnRef>
+          <a:fillRef idx="1">
+            <a:schemeClr val="accent1"/>
+          </a:fillRef>
+          <a:effectRef idx="0">
+            <a:schemeClr val="accent1"/>
+          </a:effectRef>
+          <a:fontRef idx="minor">
+            <a:schemeClr val="lt1"/>
+          </a:fontRef>
+        </p:style>
+        <p:txBody>
+          <a:bodyPr rtlCol="0" anchor="ctr"/>
+          <a:lstStyle/>
+          <a:p>
+            <a:pPr algn="ctr"/>
+            <a:endParaRPr lang="fr-FR"/>
+          </a:p>
+        </p:txBody>
+      </p:sp>
+      <p:sp>
+        <p:nvSpPr>
+          <p:cNvPr id="14" name="Rectangle 13"/>
+          <p:cNvSpPr/>
+          <p:nvPr/>
+        </p:nvSpPr>
+        <p:spPr>
+          <a:xfrm>
+            <a:off x="2138563" y="4357552"/>
+            <a:ext cx="1224136" cy="799639"/>
+          </a:xfrm>
+          <a:prstGeom prst="rect">
+            <a:avLst/>
+          </a:prstGeom>
+        </p:spPr>
+        <p:style>
+          <a:lnRef idx="2">
+            <a:schemeClr val="accent1">
+              <a:shade val="50000"/>
+            </a:schemeClr>
+          </a:lnRef>
+          <a:fillRef idx="1">
+            <a:schemeClr val="accent1"/>
+          </a:fillRef>
+          <a:effectRef idx="0">
+            <a:schemeClr val="accent1"/>
+          </a:effectRef>
+          <a:fontRef idx="minor">
+            <a:schemeClr val="lt1"/>
+          </a:fontRef>
+        </p:style>
+        <p:txBody>
+          <a:bodyPr rtlCol="0" anchor="ctr"/>
+          <a:lstStyle/>
+          <a:p>
+            <a:pPr algn="ctr"/>
+            <a:endParaRPr lang="fr-FR"/>
+          </a:p>
+        </p:txBody>
+      </p:sp>
+      <p:sp>
+        <p:nvSpPr>
+          <p:cNvPr id="15" name="Rectangle 14"/>
+          <p:cNvSpPr/>
+          <p:nvPr/>
+        </p:nvSpPr>
+        <p:spPr>
+          <a:xfrm>
+            <a:off x="3714595" y="4337879"/>
+            <a:ext cx="1389856" cy="838983"/>
+          </a:xfrm>
+          <a:prstGeom prst="rect">
+            <a:avLst/>
+          </a:prstGeom>
+        </p:spPr>
+        <p:style>
+          <a:lnRef idx="2">
+            <a:schemeClr val="accent1">
+              <a:shade val="50000"/>
+            </a:schemeClr>
+          </a:lnRef>
+          <a:fillRef idx="1">
+            <a:schemeClr val="accent1"/>
+          </a:fillRef>
+          <a:effectRef idx="0">
+            <a:schemeClr val="accent1"/>
+          </a:effectRef>
+          <a:fontRef idx="minor">
+            <a:schemeClr val="lt1"/>
+          </a:fontRef>
+        </p:style>
+        <p:txBody>
+          <a:bodyPr rtlCol="0" anchor="ctr"/>
+          <a:lstStyle/>
+          <a:p>
+            <a:pPr algn="ctr"/>
+            <a:endParaRPr lang="fr-FR" dirty="0"/>
+          </a:p>
+        </p:txBody>
+      </p:sp>
+      <p:sp>
+        <p:nvSpPr>
+          <p:cNvPr id="16" name="ZoneTexte 15"/>
+          <p:cNvSpPr txBox="1"/>
+          <p:nvPr/>
+        </p:nvSpPr>
+        <p:spPr>
+          <a:xfrm>
+            <a:off x="2841340" y="5157192"/>
+            <a:ext cx="3821360" cy="369332"/>
+          </a:xfrm>
+          <a:prstGeom prst="rect">
+            <a:avLst/>
+          </a:prstGeom>
+          <a:noFill/>
+        </p:spPr>
+        <p:txBody>
+          <a:bodyPr wrap="square" rtlCol="0">
+            <a:spAutoFit/>
+          </a:bodyPr>
+          <a:lstStyle/>
+          <a:p>
+            <a:r>
+              <a:rPr lang="fr-FR" dirty="0" smtClean="0"/>
+              <a:t>3 </a:t>
+            </a:r>
+            <a:r>
+              <a:rPr lang="fr-FR" dirty="0" err="1" smtClean="0"/>
+              <a:t>ième</a:t>
+            </a:r>
+            <a:r>
+              <a:rPr lang="fr-FR" dirty="0" smtClean="0"/>
+              <a:t> présentation  devant le gardien</a:t>
+            </a:r>
+            <a:endParaRPr lang="fr-FR" dirty="0"/>
+          </a:p>
+        </p:txBody>
+      </p:sp>
+      <p:sp>
+        <p:nvSpPr>
+          <p:cNvPr id="17" name="Rectangle 16"/>
+          <p:cNvSpPr/>
+          <p:nvPr/>
+        </p:nvSpPr>
+        <p:spPr>
+          <a:xfrm>
+            <a:off x="3040151" y="5733256"/>
+            <a:ext cx="1224136" cy="648072"/>
+          </a:xfrm>
+          <a:prstGeom prst="rect">
+            <a:avLst/>
+          </a:prstGeom>
+        </p:spPr>
+        <p:style>
+          <a:lnRef idx="2">
+            <a:schemeClr val="accent1">
+              <a:shade val="50000"/>
+            </a:schemeClr>
+          </a:lnRef>
+          <a:fillRef idx="1">
+            <a:schemeClr val="accent1"/>
+          </a:fillRef>
+          <a:effectRef idx="0">
+            <a:schemeClr val="accent1"/>
+          </a:effectRef>
+          <a:fontRef idx="minor">
+            <a:schemeClr val="lt1"/>
+          </a:fontRef>
+        </p:style>
+        <p:txBody>
+          <a:bodyPr rtlCol="0" anchor="ctr"/>
+          <a:lstStyle/>
+          <a:p>
+            <a:pPr algn="ctr"/>
+            <a:endParaRPr lang="fr-FR"/>
+          </a:p>
+        </p:txBody>
+      </p:sp>
+      <p:sp>
+        <p:nvSpPr>
+          <p:cNvPr id="18" name="Rectangle 17"/>
+          <p:cNvSpPr/>
+          <p:nvPr/>
+        </p:nvSpPr>
+        <p:spPr>
+          <a:xfrm>
+            <a:off x="5335488" y="5733256"/>
+            <a:ext cx="1224136" cy="648072"/>
+          </a:xfrm>
+          <a:prstGeom prst="rect">
+            <a:avLst/>
+          </a:prstGeom>
+        </p:spPr>
+        <p:style>
+          <a:lnRef idx="2">
+            <a:schemeClr val="accent1">
+              <a:shade val="50000"/>
+            </a:schemeClr>
+          </a:lnRef>
+          <a:fillRef idx="1">
+            <a:schemeClr val="accent1"/>
+          </a:fillRef>
+          <a:effectRef idx="0">
+            <a:schemeClr val="accent1"/>
+          </a:effectRef>
+          <a:fontRef idx="minor">
+            <a:schemeClr val="lt1"/>
+          </a:fontRef>
+        </p:style>
+        <p:txBody>
+          <a:bodyPr rtlCol="0" anchor="ctr"/>
+          <a:lstStyle/>
+          <a:p>
+            <a:pPr algn="ctr"/>
+            <a:endParaRPr lang="fr-FR"/>
+          </a:p>
+        </p:txBody>
+      </p:sp>
+      <p:sp>
+        <p:nvSpPr>
+          <p:cNvPr id="19" name="ZoneTexte 18"/>
+          <p:cNvSpPr txBox="1"/>
+          <p:nvPr/>
+        </p:nvSpPr>
+        <p:spPr>
+          <a:xfrm>
+            <a:off x="5335488" y="2069896"/>
+            <a:ext cx="892696" cy="600164"/>
+          </a:xfrm>
+          <a:prstGeom prst="rect">
+            <a:avLst/>
+          </a:prstGeom>
+          <a:noFill/>
+        </p:spPr>
+        <p:txBody>
+          <a:bodyPr wrap="square" rtlCol="0">
+            <a:spAutoFit/>
+          </a:bodyPr>
+          <a:lstStyle/>
+          <a:p>
+            <a:r>
+              <a:rPr lang="fr-FR" sz="1100" dirty="0" smtClean="0"/>
+              <a:t>6 Objets ramassés, Victoire</a:t>
+            </a:r>
+            <a:endParaRPr lang="fr-FR" sz="1100" dirty="0"/>
+          </a:p>
+        </p:txBody>
+      </p:sp>
+      <p:sp>
+        <p:nvSpPr>
+          <p:cNvPr id="20" name="ZoneTexte 19"/>
+          <p:cNvSpPr txBox="1"/>
+          <p:nvPr/>
+        </p:nvSpPr>
+        <p:spPr>
+          <a:xfrm>
+            <a:off x="2957647" y="2045942"/>
+            <a:ext cx="1224136" cy="600164"/>
+          </a:xfrm>
+          <a:prstGeom prst="rect">
+            <a:avLst/>
+          </a:prstGeom>
+          <a:noFill/>
+        </p:spPr>
+        <p:txBody>
+          <a:bodyPr wrap="square" rtlCol="0">
+            <a:spAutoFit/>
+          </a:bodyPr>
+          <a:lstStyle/>
+          <a:p>
+            <a:r>
+              <a:rPr lang="fr-FR" sz="1100" dirty="0" smtClean="0"/>
+              <a:t>Inferieure à 6 Objets ramassés, Gardien en colère</a:t>
+            </a:r>
+            <a:endParaRPr lang="fr-FR" sz="1100" dirty="0"/>
+          </a:p>
+        </p:txBody>
+      </p:sp>
+      <p:sp>
+        <p:nvSpPr>
+          <p:cNvPr id="21" name="ZoneTexte 20"/>
+          <p:cNvSpPr txBox="1"/>
+          <p:nvPr/>
+        </p:nvSpPr>
+        <p:spPr>
+          <a:xfrm>
+            <a:off x="5487888" y="3565465"/>
+            <a:ext cx="892696" cy="600164"/>
+          </a:xfrm>
+          <a:prstGeom prst="rect">
+            <a:avLst/>
+          </a:prstGeom>
+          <a:noFill/>
+        </p:spPr>
+        <p:txBody>
+          <a:bodyPr wrap="square" rtlCol="0">
+            <a:spAutoFit/>
+          </a:bodyPr>
+          <a:lstStyle/>
+          <a:p>
+            <a:r>
+              <a:rPr lang="fr-FR" sz="1100" dirty="0" smtClean="0"/>
+              <a:t>6 Objets ramassés, Victoire</a:t>
+            </a:r>
+            <a:endParaRPr lang="fr-FR" sz="1100" dirty="0"/>
+          </a:p>
+        </p:txBody>
+      </p:sp>
+      <p:sp>
+        <p:nvSpPr>
+          <p:cNvPr id="22" name="ZoneTexte 21"/>
+          <p:cNvSpPr txBox="1"/>
+          <p:nvPr/>
+        </p:nvSpPr>
+        <p:spPr>
+          <a:xfrm>
+            <a:off x="5479504" y="5757210"/>
+            <a:ext cx="892696" cy="600164"/>
+          </a:xfrm>
+          <a:prstGeom prst="rect">
+            <a:avLst/>
+          </a:prstGeom>
+          <a:noFill/>
+        </p:spPr>
+        <p:txBody>
+          <a:bodyPr wrap="square" rtlCol="0">
+            <a:spAutoFit/>
+          </a:bodyPr>
+          <a:lstStyle/>
+          <a:p>
+            <a:r>
+              <a:rPr lang="fr-FR" sz="1100" dirty="0" smtClean="0"/>
+              <a:t>6 Objets ramassés, Victoire</a:t>
+            </a:r>
+            <a:endParaRPr lang="fr-FR" sz="1100" dirty="0"/>
+          </a:p>
+        </p:txBody>
+      </p:sp>
+      <p:sp>
+        <p:nvSpPr>
+          <p:cNvPr id="25" name="ZoneTexte 24"/>
+          <p:cNvSpPr txBox="1"/>
+          <p:nvPr/>
+        </p:nvSpPr>
+        <p:spPr>
+          <a:xfrm>
+            <a:off x="2987824" y="3565465"/>
+            <a:ext cx="1224136" cy="430887"/>
+          </a:xfrm>
+          <a:prstGeom prst="rect">
+            <a:avLst/>
+          </a:prstGeom>
+          <a:noFill/>
+        </p:spPr>
+        <p:txBody>
+          <a:bodyPr wrap="square" rtlCol="0">
+            <a:spAutoFit/>
+          </a:bodyPr>
+          <a:lstStyle/>
+          <a:p>
+            <a:r>
+              <a:rPr lang="fr-FR" sz="1100" dirty="0" smtClean="0"/>
+              <a:t>Inferieure à 6 Objets ramassés, </a:t>
+            </a:r>
+            <a:endParaRPr lang="fr-FR" sz="1100" dirty="0"/>
+          </a:p>
+        </p:txBody>
+      </p:sp>
+      <p:sp>
+        <p:nvSpPr>
+          <p:cNvPr id="26" name="ZoneTexte 25"/>
+          <p:cNvSpPr txBox="1"/>
+          <p:nvPr/>
+        </p:nvSpPr>
+        <p:spPr>
+          <a:xfrm>
+            <a:off x="2119416" y="4357552"/>
+            <a:ext cx="1431152" cy="938719"/>
+          </a:xfrm>
+          <a:prstGeom prst="rect">
+            <a:avLst/>
+          </a:prstGeom>
+          <a:noFill/>
+        </p:spPr>
+        <p:txBody>
+          <a:bodyPr wrap="square" rtlCol="0">
+            <a:spAutoFit/>
+          </a:bodyPr>
+          <a:lstStyle/>
+          <a:p>
+            <a:r>
+              <a:rPr lang="fr-FR" sz="1100" dirty="0" smtClean="0"/>
+              <a:t>Objets ramassés &gt; Objets ramassés  précédemment </a:t>
+            </a:r>
+          </a:p>
+          <a:p>
+            <a:r>
+              <a:rPr lang="fr-FR" sz="1100" dirty="0" smtClean="0"/>
+              <a:t>Gardien en colère</a:t>
+            </a:r>
+          </a:p>
+          <a:p>
+            <a:endParaRPr lang="fr-FR" sz="1100" dirty="0"/>
+          </a:p>
+        </p:txBody>
+      </p:sp>
+      <p:sp>
+        <p:nvSpPr>
+          <p:cNvPr id="27" name="ZoneTexte 26"/>
+          <p:cNvSpPr txBox="1"/>
+          <p:nvPr/>
+        </p:nvSpPr>
+        <p:spPr>
+          <a:xfrm>
+            <a:off x="3714595" y="4337879"/>
+            <a:ext cx="1495845" cy="938719"/>
+          </a:xfrm>
+          <a:prstGeom prst="rect">
+            <a:avLst/>
+          </a:prstGeom>
+          <a:noFill/>
+        </p:spPr>
+        <p:txBody>
+          <a:bodyPr wrap="square" rtlCol="0">
+            <a:spAutoFit/>
+          </a:bodyPr>
+          <a:lstStyle/>
+          <a:p>
+            <a:r>
+              <a:rPr lang="fr-FR" sz="1100" dirty="0" smtClean="0"/>
+              <a:t>Objets ramassés = Objets ramassés  précédemment </a:t>
+            </a:r>
+          </a:p>
+          <a:p>
+            <a:r>
+              <a:rPr lang="fr-FR" sz="1100" dirty="0" smtClean="0"/>
+              <a:t>Gardien très en colère</a:t>
+            </a:r>
+          </a:p>
+          <a:p>
+            <a:endParaRPr lang="fr-FR" sz="1100" dirty="0"/>
+          </a:p>
+        </p:txBody>
+      </p:sp>
+      <p:sp>
+        <p:nvSpPr>
+          <p:cNvPr id="28" name="ZoneTexte 27"/>
+          <p:cNvSpPr txBox="1"/>
+          <p:nvPr/>
+        </p:nvSpPr>
+        <p:spPr>
+          <a:xfrm>
+            <a:off x="3040418" y="5733256"/>
+            <a:ext cx="1224136" cy="600164"/>
+          </a:xfrm>
+          <a:prstGeom prst="rect">
+            <a:avLst/>
+          </a:prstGeom>
+          <a:noFill/>
+        </p:spPr>
+        <p:txBody>
+          <a:bodyPr wrap="square" rtlCol="0">
+            <a:spAutoFit/>
+          </a:bodyPr>
+          <a:lstStyle/>
+          <a:p>
+            <a:r>
+              <a:rPr lang="fr-FR" sz="1100" dirty="0" smtClean="0"/>
+              <a:t>Inferieure à 6 Objets ramassés, Perdu</a:t>
+            </a:r>
+            <a:endParaRPr lang="fr-FR" sz="1100" dirty="0"/>
+          </a:p>
+        </p:txBody>
+      </p:sp>
+    </p:spTree>
+    <p:extLst>
+      <p:ext uri="{BB962C8B-B14F-4D97-AF65-F5344CB8AC3E}">
+        <p14:creationId xmlns:p14="http://schemas.microsoft.com/office/powerpoint/2010/main" val="2051978740"/>
+      </p:ext>
+    </p:extLst>
+  </p:cSld>
+  <p:clrMapOvr>
+    <a:masterClrMapping/>
+  </p:clrMapOvr>
+  <p:timing>
+    <p:tnLst>
+      <p:par>
+        <p:cTn id="1" dur="indefinite" restart="never" nodeType="tmRoot"/>
+      </p:par>
+    </p:tnLst>
+  </p:timing>
+</p:sld>
+</file>
+
+<file path=ppt/slides/slide11.xml><?xml version="1.0" encoding="utf-8"?>
+<p:sld xmlns:a="http://schemas.openxmlformats.org/drawingml/2006/main" xmlns:r="http://schemas.openxmlformats.org/officeDocument/2006/relationships" xmlns:p="http://schemas.openxmlformats.org/presentationml/2006/main">
+  <p:cSld>
+    <p:spTree>
+      <p:nvGrpSpPr>
+        <p:cNvPr id="1" name=""/>
+        <p:cNvGrpSpPr/>
+        <p:nvPr/>
+      </p:nvGrpSpPr>
+      <p:grpSpPr>
+        <a:xfrm>
+          <a:off x="0" y="0"/>
+          <a:ext cx="0" cy="0"/>
+          <a:chOff x="0" y="0"/>
+          <a:chExt cx="0" cy="0"/>
+        </a:xfrm>
+      </p:grpSpPr>
+      <p:sp>
+        <p:nvSpPr>
+          <p:cNvPr id="2" name="Titre 1"/>
+          <p:cNvSpPr>
+            <a:spLocks noGrp="1"/>
+          </p:cNvSpPr>
+          <p:nvPr>
+            <p:ph type="title"/>
+          </p:nvPr>
+        </p:nvSpPr>
+        <p:spPr/>
+        <p:txBody>
+          <a:bodyPr/>
+          <a:lstStyle/>
+          <a:p>
+            <a:r>
+              <a:rPr lang="fr-FR" dirty="0" smtClean="0"/>
+              <a:t>Respect PEP8</a:t>
+            </a:r>
+            <a:endParaRPr lang="fr-FR" dirty="0"/>
+          </a:p>
+        </p:txBody>
+      </p:sp>
+      <p:pic>
+        <p:nvPicPr>
+          <p:cNvPr id="4" name="Espace réservé du contenu 3"/>
+          <p:cNvPicPr>
+            <a:picLocks noGrp="1" noChangeAspect="1"/>
+          </p:cNvPicPr>
+          <p:nvPr>
+            <p:ph idx="1"/>
+          </p:nvPr>
+        </p:nvPicPr>
+        <p:blipFill>
+          <a:blip r:embed="rId2">
+            <a:extLst>
+              <a:ext uri="{28A0092B-C50C-407E-A947-70E740481C1C}">
+                <a14:useLocalDpi xmlns:a14="http://schemas.microsoft.com/office/drawing/2010/main" val="0"/>
+              </a:ext>
+            </a:extLst>
+          </a:blip>
+          <a:stretch>
+            <a:fillRect/>
+          </a:stretch>
+        </p:blipFill>
+        <p:spPr>
+          <a:xfrm>
+            <a:off x="3260762" y="1447800"/>
+            <a:ext cx="3848025" cy="4800600"/>
+          </a:xfrm>
+        </p:spPr>
+      </p:pic>
+    </p:spTree>
+    <p:extLst>
+      <p:ext uri="{BB962C8B-B14F-4D97-AF65-F5344CB8AC3E}">
+        <p14:creationId xmlns:p14="http://schemas.microsoft.com/office/powerpoint/2010/main" val="72190118"/>
+      </p:ext>
+    </p:extLst>
+  </p:cSld>
+  <p:clrMapOvr>
+    <a:masterClrMapping/>
+  </p:clrMapOvr>
+</p:sld>
+</file>
+
+<file path=ppt/slides/slide12.xml><?xml version="1.0" encoding="utf-8"?>
+<p:sld xmlns:a="http://schemas.openxmlformats.org/drawingml/2006/main" xmlns:r="http://schemas.openxmlformats.org/officeDocument/2006/relationships" xmlns:p="http://schemas.openxmlformats.org/presentationml/2006/main">
+  <p:cSld>
+    <p:spTree>
+      <p:nvGrpSpPr>
+        <p:cNvPr id="1" name=""/>
+        <p:cNvGrpSpPr/>
+        <p:nvPr/>
+      </p:nvGrpSpPr>
+      <p:grpSpPr>
+        <a:xfrm>
+          <a:off x="0" y="0"/>
+          <a:ext cx="0" cy="0"/>
+          <a:chOff x="0" y="0"/>
+          <a:chExt cx="0" cy="0"/>
+        </a:xfrm>
+      </p:grpSpPr>
+      <p:sp>
+        <p:nvSpPr>
+          <p:cNvPr id="2" name="Titre 1"/>
+          <p:cNvSpPr>
+            <a:spLocks noGrp="1"/>
+          </p:cNvSpPr>
+          <p:nvPr>
+            <p:ph type="title"/>
+          </p:nvPr>
+        </p:nvSpPr>
+        <p:spPr/>
+        <p:txBody>
+          <a:bodyPr>
+            <a:normAutofit fontScale="90000"/>
+          </a:bodyPr>
+          <a:lstStyle/>
+          <a:p>
+            <a:r>
+              <a:rPr lang="fr-FR" dirty="0"/>
+              <a:t>Conclusion et perspective d’évolution</a:t>
+            </a:r>
+            <a:br>
+              <a:rPr lang="fr-FR" dirty="0"/>
+            </a:br>
+            <a:endParaRPr lang="fr-FR" dirty="0"/>
+          </a:p>
+        </p:txBody>
+      </p:sp>
+      <p:sp>
+        <p:nvSpPr>
           <p:cNvPr id="3" name="Espace réservé du contenu 2"/>
           <p:cNvSpPr>
             <a:spLocks noGrp="1"/>
@@ -4681,7 +5516,7 @@
             </a:r>
             <a:r>
               <a:rPr lang="fr-FR" sz="1600" dirty="0" err="1" smtClean="0"/>
-              <a:t>Gayver</a:t>
+              <a:t>Gyver</a:t>
             </a:r>
             <a:endParaRPr lang="fr-FR" sz="1600" dirty="0"/>
           </a:p>
@@ -4759,7 +5594,9 @@
         </p:nvSpPr>
         <p:spPr/>
         <p:txBody>
-          <a:bodyPr/>
+          <a:bodyPr>
+            <a:normAutofit lnSpcReduction="10000"/>
+          </a:bodyPr>
           <a:lstStyle/>
           <a:p>
             <a:r>
@@ -4770,8 +5607,19 @@
           <a:p>
             <a:r>
               <a:rPr lang="fr-FR" dirty="0" smtClean="0"/>
-              <a:t>Démo du jeu</a:t>
-            </a:r>
+              <a:t>Démo du </a:t>
+            </a:r>
+            <a:r>
+              <a:rPr lang="fr-FR" dirty="0" smtClean="0"/>
+              <a:t>jeu</a:t>
+            </a:r>
+          </a:p>
+          <a:p>
+            <a:r>
+              <a:rPr lang="fr-FR" dirty="0" smtClean="0"/>
+              <a:t>Structure du projet</a:t>
+            </a:r>
+            <a:endParaRPr lang="fr-FR" dirty="0" smtClean="0"/>
           </a:p>
           <a:p>
             <a:r>
@@ -4800,6 +5648,13 @@
               <a:rPr lang="fr-FR" dirty="0" smtClean="0"/>
               <a:t>gardien</a:t>
             </a:r>
+          </a:p>
+          <a:p>
+            <a:r>
+              <a:rPr lang="fr-FR" dirty="0" smtClean="0"/>
+              <a:t>Respect de la PEP8</a:t>
+            </a:r>
+            <a:endParaRPr lang="fr-FR" dirty="0" smtClean="0"/>
           </a:p>
           <a:p>
             <a:r>
@@ -4952,7 +5807,7 @@
             </a:r>
             <a:r>
               <a:rPr lang="fr-FR" dirty="0" err="1" smtClean="0"/>
-              <a:t>Gayver</a:t>
+              <a:t>Gyver</a:t>
             </a:r>
             <a:r>
               <a:rPr lang="fr-FR" dirty="0" smtClean="0"/>
@@ -5109,6 +5964,88 @@
         </p:nvSpPr>
         <p:spPr/>
         <p:txBody>
+          <a:bodyPr/>
+          <a:lstStyle/>
+          <a:p>
+            <a:r>
+              <a:rPr lang="fr-FR" dirty="0" smtClean="0"/>
+              <a:t>Structure du Projet</a:t>
+            </a:r>
+            <a:endParaRPr lang="fr-FR" dirty="0"/>
+          </a:p>
+        </p:txBody>
+      </p:sp>
+      <p:pic>
+        <p:nvPicPr>
+          <p:cNvPr id="4" name="Espace réservé du contenu 3"/>
+          <p:cNvPicPr>
+            <a:picLocks noGrp="1" noChangeAspect="1"/>
+          </p:cNvPicPr>
+          <p:nvPr>
+            <p:ph idx="1"/>
+          </p:nvPr>
+        </p:nvPicPr>
+        <p:blipFill>
+          <a:blip r:embed="rId2">
+            <a:extLst>
+              <a:ext uri="{28A0092B-C50C-407E-A947-70E740481C1C}">
+                <a14:useLocalDpi xmlns:a14="http://schemas.microsoft.com/office/drawing/2010/main" val="0"/>
+              </a:ext>
+            </a:extLst>
+          </a:blip>
+          <a:stretch>
+            <a:fillRect/>
+          </a:stretch>
+        </p:blipFill>
+        <p:spPr>
+          <a:xfrm>
+            <a:off x="2083954" y="2323887"/>
+            <a:ext cx="6201641" cy="3048426"/>
+          </a:xfrm>
+        </p:spPr>
+      </p:pic>
+    </p:spTree>
+    <p:extLst>
+      <p:ext uri="{BB962C8B-B14F-4D97-AF65-F5344CB8AC3E}">
+        <p14:creationId xmlns:p14="http://schemas.microsoft.com/office/powerpoint/2010/main" val="231720075"/>
+      </p:ext>
+    </p:extLst>
+  </p:cSld>
+  <p:clrMapOvr>
+    <a:masterClrMapping/>
+  </p:clrMapOvr>
+</p:sld>
+</file>
+
+<file path=ppt/slides/slide6.xml><?xml version="1.0" encoding="utf-8"?>
+<p:sld xmlns:a="http://schemas.openxmlformats.org/drawingml/2006/main" xmlns:r="http://schemas.openxmlformats.org/officeDocument/2006/relationships" xmlns:p="http://schemas.openxmlformats.org/presentationml/2006/main">
+  <p:cSld>
+    <p:spTree>
+      <p:nvGrpSpPr>
+        <p:cNvPr id="1" name=""/>
+        <p:cNvGrpSpPr/>
+        <p:nvPr/>
+      </p:nvGrpSpPr>
+      <p:grpSpPr>
+        <a:xfrm>
+          <a:off x="0" y="0"/>
+          <a:ext cx="0" cy="0"/>
+          <a:chOff x="0" y="0"/>
+          <a:chExt cx="0" cy="0"/>
+        </a:xfrm>
+      </p:grpSpPr>
+      <p:sp>
+        <p:nvSpPr>
+          <p:cNvPr id="2" name="Titre 1"/>
+          <p:cNvSpPr>
+            <a:spLocks noGrp="1"/>
+          </p:cNvSpPr>
+          <p:nvPr>
+            <p:ph type="title"/>
+          </p:nvPr>
+        </p:nvSpPr>
+        <p:spPr/>
+        <p:txBody>
           <a:bodyPr>
             <a:normAutofit fontScale="90000"/>
           </a:bodyPr>
@@ -5459,219 +6396,6 @@
     <p:extLst>
       <p:ext uri="{BB962C8B-B14F-4D97-AF65-F5344CB8AC3E}">
         <p14:creationId xmlns:p14="http://schemas.microsoft.com/office/powerpoint/2010/main" val="2528398328"/>
-      </p:ext>
-    </p:extLst>
-  </p:cSld>
-  <p:clrMapOvr>
-    <a:masterClrMapping/>
-  </p:clrMapOvr>
-  <p:timing>
-    <p:tnLst>
-      <p:par>
-        <p:cTn id="1" dur="indefinite" restart="never" nodeType="tmRoot"/>
-      </p:par>
-    </p:tnLst>
-  </p:timing>
-</p:sld>
-</file>
-
-<file path=ppt/slides/slide6.xml><?xml version="1.0" encoding="utf-8"?>
-<p:sld xmlns:a="http://schemas.openxmlformats.org/drawingml/2006/main" xmlns:r="http://schemas.openxmlformats.org/officeDocument/2006/relationships" xmlns:p="http://schemas.openxmlformats.org/presentationml/2006/main">
-  <p:cSld>
-    <p:spTree>
-      <p:nvGrpSpPr>
-        <p:cNvPr id="1" name=""/>
-        <p:cNvGrpSpPr/>
-        <p:nvPr/>
-      </p:nvGrpSpPr>
-      <p:grpSpPr>
-        <a:xfrm>
-          <a:off x="0" y="0"/>
-          <a:ext cx="0" cy="0"/>
-          <a:chOff x="0" y="0"/>
-          <a:chExt cx="0" cy="0"/>
-        </a:xfrm>
-      </p:grpSpPr>
-      <p:sp>
-        <p:nvSpPr>
-          <p:cNvPr id="2" name="Titre 1"/>
-          <p:cNvSpPr>
-            <a:spLocks noGrp="1"/>
-          </p:cNvSpPr>
-          <p:nvPr>
-            <p:ph type="title"/>
-          </p:nvPr>
-        </p:nvSpPr>
-        <p:spPr/>
-        <p:txBody>
-          <a:bodyPr>
-            <a:normAutofit fontScale="90000"/>
-          </a:bodyPr>
-          <a:lstStyle/>
-          <a:p>
-            <a:r>
-              <a:rPr lang="fr-FR" dirty="0"/>
-              <a:t>Déplacement et gestion des collisions</a:t>
-            </a:r>
-            <a:br>
-              <a:rPr lang="fr-FR" dirty="0"/>
-            </a:br>
-            <a:endParaRPr lang="fr-FR" dirty="0"/>
-          </a:p>
-        </p:txBody>
-      </p:sp>
-      <p:pic>
-        <p:nvPicPr>
-          <p:cNvPr id="4" name="Espace réservé du contenu 3"/>
-          <p:cNvPicPr>
-            <a:picLocks noGrp="1" noChangeAspect="1"/>
-          </p:cNvPicPr>
-          <p:nvPr>
-            <p:ph idx="1"/>
-          </p:nvPr>
-        </p:nvPicPr>
-        <p:blipFill>
-          <a:blip r:embed="rId2">
-            <a:extLst>
-              <a:ext uri="{28A0092B-C50C-407E-A947-70E740481C1C}">
-                <a14:useLocalDpi xmlns:a14="http://schemas.microsoft.com/office/drawing/2010/main" val="0"/>
-              </a:ext>
-            </a:extLst>
-          </a:blip>
-          <a:stretch>
-            <a:fillRect/>
-          </a:stretch>
-        </p:blipFill>
-        <p:spPr>
-          <a:xfrm>
-            <a:off x="6583833" y="1452523"/>
-            <a:ext cx="1304925" cy="1257300"/>
-          </a:xfrm>
-        </p:spPr>
-      </p:pic>
-      <p:sp>
-        <p:nvSpPr>
-          <p:cNvPr id="5" name="ZoneTexte 4"/>
-          <p:cNvSpPr txBox="1"/>
-          <p:nvPr/>
-        </p:nvSpPr>
-        <p:spPr>
-          <a:xfrm>
-            <a:off x="1475656" y="1619508"/>
-            <a:ext cx="3528392" cy="923330"/>
-          </a:xfrm>
-          <a:prstGeom prst="rect">
-            <a:avLst/>
-          </a:prstGeom>
-          <a:noFill/>
-        </p:spPr>
-        <p:txBody>
-          <a:bodyPr wrap="square" rtlCol="0">
-            <a:spAutoFit/>
-          </a:bodyPr>
-          <a:lstStyle/>
-          <a:p>
-            <a:r>
-              <a:rPr lang="fr-FR" dirty="0" smtClean="0"/>
-              <a:t>Le déplacement est géré à chaque pression sur une flèche directionnel du clavier</a:t>
-            </a:r>
-          </a:p>
-        </p:txBody>
-      </p:sp>
-      <p:pic>
-        <p:nvPicPr>
-          <p:cNvPr id="7" name="Image 6"/>
-          <p:cNvPicPr>
-            <a:picLocks noChangeAspect="1"/>
-          </p:cNvPicPr>
-          <p:nvPr/>
-        </p:nvPicPr>
-        <p:blipFill>
-          <a:blip r:embed="rId3">
-            <a:extLst>
-              <a:ext uri="{28A0092B-C50C-407E-A947-70E740481C1C}">
-                <a14:useLocalDpi xmlns:a14="http://schemas.microsoft.com/office/drawing/2010/main" val="0"/>
-              </a:ext>
-            </a:extLst>
-          </a:blip>
-          <a:stretch>
-            <a:fillRect/>
-          </a:stretch>
-        </p:blipFill>
-        <p:spPr>
-          <a:xfrm>
-            <a:off x="1777764" y="2542838"/>
-            <a:ext cx="2924175" cy="838200"/>
-          </a:xfrm>
-          <a:prstGeom prst="rect">
-            <a:avLst/>
-          </a:prstGeom>
-        </p:spPr>
-      </p:pic>
-      <p:pic>
-        <p:nvPicPr>
-          <p:cNvPr id="8" name="Image 7"/>
-          <p:cNvPicPr>
-            <a:picLocks noChangeAspect="1"/>
-          </p:cNvPicPr>
-          <p:nvPr/>
-        </p:nvPicPr>
-        <p:blipFill>
-          <a:blip r:embed="rId4">
-            <a:extLst>
-              <a:ext uri="{28A0092B-C50C-407E-A947-70E740481C1C}">
-                <a14:useLocalDpi xmlns:a14="http://schemas.microsoft.com/office/drawing/2010/main" val="0"/>
-              </a:ext>
-            </a:extLst>
-          </a:blip>
-          <a:stretch>
-            <a:fillRect/>
-          </a:stretch>
-        </p:blipFill>
-        <p:spPr>
-          <a:xfrm>
-            <a:off x="4061073" y="4039344"/>
-            <a:ext cx="1885950" cy="609600"/>
-          </a:xfrm>
-          <a:prstGeom prst="rect">
-            <a:avLst/>
-          </a:prstGeom>
-        </p:spPr>
-      </p:pic>
-      <p:sp>
-        <p:nvSpPr>
-          <p:cNvPr id="9" name="ZoneTexte 8"/>
-          <p:cNvSpPr txBox="1"/>
-          <p:nvPr/>
-        </p:nvSpPr>
-        <p:spPr>
-          <a:xfrm>
-            <a:off x="1547664" y="3379581"/>
-            <a:ext cx="6840760" cy="646331"/>
-          </a:xfrm>
-          <a:prstGeom prst="rect">
-            <a:avLst/>
-          </a:prstGeom>
-          <a:noFill/>
-        </p:spPr>
-        <p:txBody>
-          <a:bodyPr wrap="square" rtlCol="0">
-            <a:spAutoFit/>
-          </a:bodyPr>
-          <a:lstStyle/>
-          <a:p>
-            <a:r>
-              <a:rPr lang="fr-FR" dirty="0" smtClean="0"/>
-              <a:t>On augmente ou décrémente la position de l’image en fonction du déplacement</a:t>
-            </a:r>
-            <a:endParaRPr lang="fr-FR" dirty="0"/>
-          </a:p>
-        </p:txBody>
-      </p:sp>
-    </p:spTree>
-    <p:extLst>
-      <p:ext uri="{BB962C8B-B14F-4D97-AF65-F5344CB8AC3E}">
-        <p14:creationId xmlns:p14="http://schemas.microsoft.com/office/powerpoint/2010/main" val="796994068"/>
       </p:ext>
     </p:extLst>
   </p:cSld>
@@ -5726,6 +6450,10 @@
               <a:rPr lang="fr-FR" dirty="0"/>
               <a:t>Déplacement et gestion des collisions</a:t>
             </a:r>
+            <a:br>
+              <a:rPr lang="fr-FR" dirty="0"/>
+            </a:br>
+            <a:endParaRPr lang="fr-FR" dirty="0"/>
           </a:p>
         </p:txBody>
       </p:sp>
@@ -5753,12 +6481,9 @@
         </p:blipFill>
         <p:spPr>
           <a:xfrm>
-            <a:off x="1403648" y="2780928"/>
-            <a:ext cx="7499350" cy="2374946"/>
-          </a:xfrm>
-          <a:prstGeom prst="rect">
-            <a:avLst/>
-          </a:prstGeom>
+            <a:off x="6509390" y="949745"/>
+            <a:ext cx="1304925" cy="1257300"/>
+          </a:xfrm>
         </p:spPr>
       </p:pic>
       <p:sp>
@@ -5769,8 +6494,8 @@
         </p:nvSpPr>
         <p:spPr>
           <a:xfrm>
-            <a:off x="1750012" y="1988840"/>
-            <a:ext cx="5904656" cy="646331"/>
+            <a:off x="1439652" y="1340768"/>
+            <a:ext cx="3528392" cy="923330"/>
           </a:xfrm>
           <a:prstGeom prst="rect">
             <a:avLst/>
@@ -5785,24 +6510,135 @@
           <a:p>
             <a:r>
               <a:rPr lang="fr-FR" dirty="0" smtClean="0"/>
-              <a:t>On regarde ensuite ou est situé Mac </a:t>
-            </a:r>
-            <a:r>
-              <a:rPr lang="fr-FR" dirty="0" err="1" smtClean="0"/>
-              <a:t>Gayver</a:t>
-            </a:r>
+              <a:t>Le déplacement est géré à chaque pression sur une flèche directionnel du clavier</a:t>
+            </a:r>
+          </a:p>
+        </p:txBody>
+      </p:sp>
+      <p:sp>
+        <p:nvSpPr>
+          <p:cNvPr id="9" name="ZoneTexte 8"/>
+          <p:cNvSpPr txBox="1"/>
+          <p:nvPr/>
+        </p:nvSpPr>
+        <p:spPr>
+          <a:xfrm>
+            <a:off x="1547664" y="3379581"/>
+            <a:ext cx="6840760" cy="646331"/>
+          </a:xfrm>
+          <a:prstGeom prst="rect">
+            <a:avLst/>
+          </a:prstGeom>
+          <a:noFill/>
+        </p:spPr>
+        <p:txBody>
+          <a:bodyPr wrap="square" rtlCol="0">
+            <a:spAutoFit/>
+          </a:bodyPr>
+          <a:lstStyle/>
+          <a:p>
             <a:r>
               <a:rPr lang="fr-FR" dirty="0" smtClean="0"/>
-              <a:t> afin de savoir si il a le droit d avancer ou pas.</a:t>
+              <a:t>On augmente ou décrémente la position de l’image en fonction du déplacement</a:t>
             </a:r>
             <a:endParaRPr lang="fr-FR" dirty="0"/>
           </a:p>
         </p:txBody>
       </p:sp>
+      <p:pic>
+        <p:nvPicPr>
+          <p:cNvPr id="3" name="Image 2"/>
+          <p:cNvPicPr>
+            <a:picLocks noChangeAspect="1"/>
+          </p:cNvPicPr>
+          <p:nvPr/>
+        </p:nvPicPr>
+        <p:blipFill>
+          <a:blip r:embed="rId3">
+            <a:extLst>
+              <a:ext uri="{28A0092B-C50C-407E-A947-70E740481C1C}">
+                <a14:useLocalDpi xmlns:a14="http://schemas.microsoft.com/office/drawing/2010/main" val="0"/>
+              </a:ext>
+            </a:extLst>
+          </a:blip>
+          <a:stretch>
+            <a:fillRect/>
+          </a:stretch>
+        </p:blipFill>
+        <p:spPr>
+          <a:xfrm>
+            <a:off x="1547664" y="5189734"/>
+            <a:ext cx="4674626" cy="1592541"/>
+          </a:xfrm>
+          <a:prstGeom prst="rect">
+            <a:avLst/>
+          </a:prstGeom>
+        </p:spPr>
+      </p:pic>
+      <p:pic>
+        <p:nvPicPr>
+          <p:cNvPr id="6" name="Image 5"/>
+          <p:cNvPicPr>
+            <a:picLocks noChangeAspect="1"/>
+          </p:cNvPicPr>
+          <p:nvPr/>
+        </p:nvPicPr>
+        <p:blipFill>
+          <a:blip r:embed="rId4">
+            <a:extLst>
+              <a:ext uri="{28A0092B-C50C-407E-A947-70E740481C1C}">
+                <a14:useLocalDpi xmlns:a14="http://schemas.microsoft.com/office/drawing/2010/main" val="0"/>
+              </a:ext>
+            </a:extLst>
+          </a:blip>
+          <a:stretch>
+            <a:fillRect/>
+          </a:stretch>
+        </p:blipFill>
+        <p:spPr>
+          <a:xfrm>
+            <a:off x="1283607" y="2207045"/>
+            <a:ext cx="7052847" cy="1172536"/>
+          </a:xfrm>
+          <a:prstGeom prst="rect">
+            <a:avLst/>
+          </a:prstGeom>
+        </p:spPr>
+      </p:pic>
+      <p:pic>
+        <p:nvPicPr>
+          <p:cNvPr id="10" name="Image 9"/>
+          <p:cNvPicPr>
+            <a:picLocks noChangeAspect="1"/>
+          </p:cNvPicPr>
+          <p:nvPr/>
+        </p:nvPicPr>
+        <p:blipFill>
+          <a:blip r:embed="rId5">
+            <a:extLst>
+              <a:ext uri="{28A0092B-C50C-407E-A947-70E740481C1C}">
+                <a14:useLocalDpi xmlns:a14="http://schemas.microsoft.com/office/drawing/2010/main" val="0"/>
+              </a:ext>
+            </a:extLst>
+          </a:blip>
+          <a:stretch>
+            <a:fillRect/>
+          </a:stretch>
+        </p:blipFill>
+        <p:spPr>
+          <a:xfrm>
+            <a:off x="1810366" y="4059836"/>
+            <a:ext cx="4797352" cy="1073197"/>
+          </a:xfrm>
+          <a:prstGeom prst="rect">
+            <a:avLst/>
+          </a:prstGeom>
+        </p:spPr>
+      </p:pic>
     </p:spTree>
     <p:extLst>
       <p:ext uri="{BB962C8B-B14F-4D97-AF65-F5344CB8AC3E}">
-        <p14:creationId xmlns:p14="http://schemas.microsoft.com/office/powerpoint/2010/main" val="2809104501"/>
+        <p14:creationId xmlns:p14="http://schemas.microsoft.com/office/powerpoint/2010/main" val="796994068"/>
       </p:ext>
     </p:extLst>
   </p:cSld>
@@ -5855,45 +6691,20 @@
           <a:p>
             <a:r>
               <a:rPr lang="fr-FR" dirty="0"/>
-              <a:t>Positionnement des objets</a:t>
-            </a:r>
-            <a:br>
-              <a:rPr lang="fr-FR" dirty="0"/>
-            </a:br>
-            <a:endParaRPr lang="fr-FR" dirty="0"/>
-          </a:p>
-        </p:txBody>
-      </p:sp>
-      <p:sp>
-        <p:nvSpPr>
-          <p:cNvPr id="3" name="Espace réservé du contenu 2"/>
-          <p:cNvSpPr>
-            <a:spLocks noGrp="1"/>
-          </p:cNvSpPr>
-          <p:nvPr>
-            <p:ph idx="1"/>
-          </p:nvPr>
-        </p:nvSpPr>
-        <p:spPr/>
-        <p:txBody>
-          <a:bodyPr/>
-          <a:lstStyle/>
-          <a:p>
-            <a:r>
-              <a:rPr lang="fr-FR" dirty="0" smtClean="0"/>
-              <a:t>Objets positionnés aléatoirement</a:t>
-            </a:r>
-            <a:endParaRPr lang="fr-FR" dirty="0"/>
+              <a:t>Déplacement et gestion des collisions</a:t>
+            </a:r>
           </a:p>
         </p:txBody>
       </p:sp>
       <p:pic>
         <p:nvPicPr>
-          <p:cNvPr id="4" name="Image 3"/>
+          <p:cNvPr id="4" name="Espace réservé du contenu 3"/>
           <p:cNvPicPr>
-            <a:picLocks noChangeAspect="1"/>
+            <a:picLocks noGrp="1" noChangeAspect="1"/>
           </p:cNvPicPr>
-          <p:nvPr/>
+          <p:nvPr>
+            <p:ph idx="1"/>
+          </p:nvPr>
         </p:nvPicPr>
         <p:blipFill>
           <a:blip r:embed="rId2">
@@ -5909,17 +6720,55 @@
         </p:blipFill>
         <p:spPr>
           <a:xfrm>
-            <a:off x="1405031" y="2538707"/>
-            <a:ext cx="6546053" cy="1272451"/>
+            <a:off x="1403648" y="2780928"/>
+            <a:ext cx="7499350" cy="2374946"/>
           </a:xfrm>
           <a:prstGeom prst="rect">
             <a:avLst/>
           </a:prstGeom>
         </p:spPr>
       </p:pic>
+      <p:sp>
+        <p:nvSpPr>
+          <p:cNvPr id="5" name="ZoneTexte 4"/>
+          <p:cNvSpPr txBox="1"/>
+          <p:nvPr/>
+        </p:nvSpPr>
+        <p:spPr>
+          <a:xfrm>
+            <a:off x="1750012" y="1988840"/>
+            <a:ext cx="5904656" cy="646331"/>
+          </a:xfrm>
+          <a:prstGeom prst="rect">
+            <a:avLst/>
+          </a:prstGeom>
+          <a:noFill/>
+        </p:spPr>
+        <p:txBody>
+          <a:bodyPr wrap="square" rtlCol="0">
+            <a:spAutoFit/>
+          </a:bodyPr>
+          <a:lstStyle/>
+          <a:p>
+            <a:r>
+              <a:rPr lang="fr-FR" dirty="0" smtClean="0"/>
+              <a:t>On regarde ensuite ou est situé Mac </a:t>
+            </a:r>
+            <a:r>
+              <a:rPr lang="fr-FR" dirty="0" err="1" smtClean="0"/>
+              <a:t>Gayver</a:t>
+            </a:r>
+            <a:r>
+              <a:rPr lang="fr-FR" dirty="0" smtClean="0"/>
+              <a:t> afin de savoir si il a le droit d avancer ou pas.</a:t>
+            </a:r>
+            <a:endParaRPr lang="fr-FR" dirty="0"/>
+          </a:p>
+        </p:txBody>
+      </p:sp>
       <p:pic>
         <p:nvPicPr>
-          <p:cNvPr id="5" name="Image 4"/>
+          <p:cNvPr id="3" name="Image 2"/>
           <p:cNvPicPr>
             <a:picLocks noChangeAspect="1"/>
           </p:cNvPicPr>
@@ -5939,78 +6788,18 @@
         </p:blipFill>
         <p:spPr>
           <a:xfrm>
-            <a:off x="1689122" y="4281561"/>
-            <a:ext cx="6480720" cy="2546560"/>
+            <a:off x="1187624" y="2635171"/>
+            <a:ext cx="7956376" cy="2766785"/>
           </a:xfrm>
           <a:prstGeom prst="rect">
             <a:avLst/>
           </a:prstGeom>
         </p:spPr>
       </p:pic>
-      <p:sp>
-        <p:nvSpPr>
-          <p:cNvPr id="6" name="ZoneTexte 5"/>
-          <p:cNvSpPr txBox="1"/>
-          <p:nvPr/>
-        </p:nvSpPr>
-        <p:spPr>
-          <a:xfrm>
-            <a:off x="1691679" y="1988840"/>
-            <a:ext cx="3368907" cy="369332"/>
-          </a:xfrm>
-          <a:prstGeom prst="rect">
-            <a:avLst/>
-          </a:prstGeom>
-          <a:noFill/>
-        </p:spPr>
-        <p:txBody>
-          <a:bodyPr wrap="square" rtlCol="0">
-            <a:spAutoFit/>
-          </a:bodyPr>
-          <a:lstStyle/>
-          <a:p>
-            <a:r>
-              <a:rPr lang="fr-FR" dirty="0" smtClean="0"/>
-              <a:t>On crée une liste Objets</a:t>
-            </a:r>
-            <a:endParaRPr lang="fr-FR" dirty="0"/>
-          </a:p>
-        </p:txBody>
-      </p:sp>
-      <p:sp>
-        <p:nvSpPr>
-          <p:cNvPr id="7" name="ZoneTexte 6"/>
-          <p:cNvSpPr txBox="1"/>
-          <p:nvPr/>
-        </p:nvSpPr>
-        <p:spPr>
-          <a:xfrm>
-            <a:off x="1801325" y="3925191"/>
-            <a:ext cx="6256314" cy="369332"/>
-          </a:xfrm>
-          <a:prstGeom prst="rect">
-            <a:avLst/>
-          </a:prstGeom>
-          <a:noFill/>
-        </p:spPr>
-        <p:txBody>
-          <a:bodyPr wrap="square" rtlCol="0">
-            <a:spAutoFit/>
-          </a:bodyPr>
-          <a:lstStyle/>
-          <a:p>
-            <a:r>
-              <a:rPr lang="fr-FR" dirty="0" smtClean="0"/>
-              <a:t>On les place de la même façon que la gestion des collisions</a:t>
-            </a:r>
-            <a:endParaRPr lang="fr-FR" dirty="0"/>
-          </a:p>
-        </p:txBody>
-      </p:sp>
     </p:spTree>
     <p:extLst>
       <p:ext uri="{BB962C8B-B14F-4D97-AF65-F5344CB8AC3E}">
-        <p14:creationId xmlns:p14="http://schemas.microsoft.com/office/powerpoint/2010/main" val="2585976212"/>
+        <p14:creationId xmlns:p14="http://schemas.microsoft.com/office/powerpoint/2010/main" val="2809104501"/>
       </p:ext>
     </p:extLst>
   </p:cSld>
@@ -6062,12 +6851,8 @@
           <a:lstStyle/>
           <a:p>
             <a:r>
-              <a:rPr lang="fr-FR" dirty="0" smtClean="0"/>
-              <a:t>Evènements </a:t>
-            </a:r>
-            <a:r>
               <a:rPr lang="fr-FR" dirty="0"/>
-              <a:t>gardien</a:t>
+              <a:t>Positionnement des objets</a:t>
             </a:r>
             <a:br>
               <a:rPr lang="fr-FR" dirty="0"/>
@@ -6078,14 +6863,37 @@
       </p:sp>
       <p:sp>
         <p:nvSpPr>
+          <p:cNvPr id="3" name="Espace réservé du contenu 2"/>
+          <p:cNvSpPr>
+            <a:spLocks noGrp="1"/>
+          </p:cNvSpPr>
+          <p:nvPr>
+            <p:ph idx="1"/>
+          </p:nvPr>
+        </p:nvSpPr>
+        <p:spPr/>
+        <p:txBody>
+          <a:bodyPr/>
+          <a:lstStyle/>
+          <a:p>
+            <a:r>
+              <a:rPr lang="fr-FR" dirty="0" smtClean="0"/>
+              <a:t>Objets positionnés aléatoirement</a:t>
+            </a:r>
+            <a:endParaRPr lang="fr-FR" dirty="0"/>
+          </a:p>
+        </p:txBody>
+      </p:sp>
+      <p:sp>
+        <p:nvSpPr>
           <p:cNvPr id="6" name="ZoneTexte 5"/>
           <p:cNvSpPr txBox="1"/>
           <p:nvPr/>
         </p:nvSpPr>
         <p:spPr>
           <a:xfrm>
-            <a:off x="2987824" y="1258172"/>
-            <a:ext cx="3528392" cy="369332"/>
+            <a:off x="1691679" y="1988840"/>
+            <a:ext cx="3368907" cy="369332"/>
           </a:xfrm>
           <a:prstGeom prst="rect">
             <a:avLst/>
@@ -6100,7 +6908,7 @@
           <a:p>
             <a:r>
               <a:rPr lang="fr-FR" dirty="0" smtClean="0"/>
-              <a:t>1 er présentation  devant le gardien</a:t>
+              <a:t>On crée une liste Objets</a:t>
             </a:r>
             <a:endParaRPr lang="fr-FR" dirty="0"/>
           </a:p>
@@ -6108,14 +6916,14 @@
       </p:sp>
       <p:sp>
         <p:nvSpPr>
-          <p:cNvPr id="9" name="ZoneTexte 8"/>
+          <p:cNvPr id="7" name="ZoneTexte 6"/>
           <p:cNvSpPr txBox="1"/>
           <p:nvPr/>
         </p:nvSpPr>
         <p:spPr>
           <a:xfrm>
-            <a:off x="2850437" y="2996952"/>
-            <a:ext cx="3821360" cy="369332"/>
+            <a:off x="1830281" y="5052618"/>
+            <a:ext cx="6256314" cy="369332"/>
           </a:xfrm>
           <a:prstGeom prst="rect">
             <a:avLst/>
@@ -6130,638 +6938,46 @@
           <a:p>
             <a:r>
               <a:rPr lang="fr-FR" dirty="0" smtClean="0"/>
-              <a:t>2 </a:t>
-            </a:r>
-            <a:r>
-              <a:rPr lang="fr-FR" dirty="0" err="1" smtClean="0"/>
-              <a:t>ième</a:t>
-            </a:r>
-            <a:r>
-              <a:rPr lang="fr-FR" dirty="0" smtClean="0"/>
-              <a:t> présentation  devant le gardien</a:t>
+              <a:t>On les place de la même façon que la gestion des collisions</a:t>
             </a:r>
             <a:endParaRPr lang="fr-FR" dirty="0"/>
           </a:p>
         </p:txBody>
       </p:sp>
-      <p:sp>
-        <p:nvSpPr>
-          <p:cNvPr id="10" name="Rectangle 9"/>
-          <p:cNvSpPr/>
+      <p:pic>
+        <p:nvPicPr>
+          <p:cNvPr id="8" name="Image 7"/>
+          <p:cNvPicPr>
+            <a:picLocks noChangeAspect="1"/>
+          </p:cNvPicPr>
           <p:nvPr/>
-        </p:nvSpPr>
-        <p:spPr>
-          <a:xfrm>
-            <a:off x="2957647" y="2021988"/>
-            <a:ext cx="1224136" cy="648072"/>
+        </p:nvPicPr>
+        <p:blipFill>
+          <a:blip r:embed="rId2">
+            <a:extLst>
+              <a:ext uri="{28A0092B-C50C-407E-A947-70E740481C1C}">
+                <a14:useLocalDpi xmlns:a14="http://schemas.microsoft.com/office/drawing/2010/main" val="0"/>
+              </a:ext>
+            </a:extLst>
+          </a:blip>
+          <a:stretch>
+            <a:fillRect/>
+          </a:stretch>
+        </p:blipFill>
+        <p:spPr>
+          <a:xfrm>
+            <a:off x="2051720" y="2358172"/>
+            <a:ext cx="5506219" cy="2505425"/>
           </a:xfrm>
           <a:prstGeom prst="rect">
             <a:avLst/>
           </a:prstGeom>
         </p:spPr>
-        <p:style>
-          <a:lnRef idx="2">
-            <a:schemeClr val="accent1">
-              <a:shade val="50000"/>
-            </a:schemeClr>
-          </a:lnRef>
-          <a:fillRef idx="1">
-            <a:schemeClr val="accent1"/>
-          </a:fillRef>
-          <a:effectRef idx="0">
-            <a:schemeClr val="accent1"/>
-          </a:effectRef>
-          <a:fontRef idx="minor">
-            <a:schemeClr val="lt1"/>
-          </a:fontRef>
-        </p:style>
-        <p:txBody>
-          <a:bodyPr rtlCol="0" anchor="ctr"/>
-          <a:lstStyle/>
-          <a:p>
-            <a:pPr algn="ctr"/>
-            <a:endParaRPr lang="fr-FR"/>
-          </a:p>
-        </p:txBody>
-      </p:sp>
-      <p:sp>
-        <p:nvSpPr>
-          <p:cNvPr id="11" name="Rectangle 10"/>
-          <p:cNvSpPr/>
-          <p:nvPr/>
-        </p:nvSpPr>
-        <p:spPr>
-          <a:xfrm>
-            <a:off x="5148064" y="2021988"/>
-            <a:ext cx="1224136" cy="648072"/>
-          </a:xfrm>
-          <a:prstGeom prst="rect">
-            <a:avLst/>
-          </a:prstGeom>
-        </p:spPr>
-        <p:style>
-          <a:lnRef idx="2">
-            <a:schemeClr val="accent1">
-              <a:shade val="50000"/>
-            </a:schemeClr>
-          </a:lnRef>
-          <a:fillRef idx="1">
-            <a:schemeClr val="accent1"/>
-          </a:fillRef>
-          <a:effectRef idx="0">
-            <a:schemeClr val="accent1"/>
-          </a:effectRef>
-          <a:fontRef idx="minor">
-            <a:schemeClr val="lt1"/>
-          </a:fontRef>
-        </p:style>
-        <p:txBody>
-          <a:bodyPr rtlCol="0" anchor="ctr"/>
-          <a:lstStyle/>
-          <a:p>
-            <a:pPr algn="ctr"/>
-            <a:endParaRPr lang="fr-FR"/>
-          </a:p>
-        </p:txBody>
-      </p:sp>
-      <p:sp>
-        <p:nvSpPr>
-          <p:cNvPr id="12" name="Rectangle 11"/>
-          <p:cNvSpPr/>
-          <p:nvPr/>
-        </p:nvSpPr>
-        <p:spPr>
-          <a:xfrm>
-            <a:off x="5335488" y="3565465"/>
-            <a:ext cx="1224136" cy="648072"/>
-          </a:xfrm>
-          <a:prstGeom prst="rect">
-            <a:avLst/>
-          </a:prstGeom>
-        </p:spPr>
-        <p:style>
-          <a:lnRef idx="2">
-            <a:schemeClr val="accent1">
-              <a:shade val="50000"/>
-            </a:schemeClr>
-          </a:lnRef>
-          <a:fillRef idx="1">
-            <a:schemeClr val="accent1"/>
-          </a:fillRef>
-          <a:effectRef idx="0">
-            <a:schemeClr val="accent1"/>
-          </a:effectRef>
-          <a:fontRef idx="minor">
-            <a:schemeClr val="lt1"/>
-          </a:fontRef>
-        </p:style>
-        <p:txBody>
-          <a:bodyPr rtlCol="0" anchor="ctr"/>
-          <a:lstStyle/>
-          <a:p>
-            <a:pPr algn="ctr"/>
-            <a:endParaRPr lang="fr-FR"/>
-          </a:p>
-        </p:txBody>
-      </p:sp>
-      <p:sp>
-        <p:nvSpPr>
-          <p:cNvPr id="13" name="Rectangle 12"/>
-          <p:cNvSpPr/>
-          <p:nvPr/>
-        </p:nvSpPr>
-        <p:spPr>
-          <a:xfrm>
-            <a:off x="3001144" y="3565465"/>
-            <a:ext cx="1224136" cy="648072"/>
-          </a:xfrm>
-          <a:prstGeom prst="rect">
-            <a:avLst/>
-          </a:prstGeom>
-        </p:spPr>
-        <p:style>
-          <a:lnRef idx="2">
-            <a:schemeClr val="accent1">
-              <a:shade val="50000"/>
-            </a:schemeClr>
-          </a:lnRef>
-          <a:fillRef idx="1">
-            <a:schemeClr val="accent1"/>
-          </a:fillRef>
-          <a:effectRef idx="0">
-            <a:schemeClr val="accent1"/>
-          </a:effectRef>
-          <a:fontRef idx="minor">
-            <a:schemeClr val="lt1"/>
-          </a:fontRef>
-        </p:style>
-        <p:txBody>
-          <a:bodyPr rtlCol="0" anchor="ctr"/>
-          <a:lstStyle/>
-          <a:p>
-            <a:pPr algn="ctr"/>
-            <a:endParaRPr lang="fr-FR"/>
-          </a:p>
-        </p:txBody>
-      </p:sp>
-      <p:sp>
-        <p:nvSpPr>
-          <p:cNvPr id="14" name="Rectangle 13"/>
-          <p:cNvSpPr/>
-          <p:nvPr/>
-        </p:nvSpPr>
-        <p:spPr>
-          <a:xfrm>
-            <a:off x="2138563" y="4357552"/>
-            <a:ext cx="1224136" cy="799639"/>
-          </a:xfrm>
-          <a:prstGeom prst="rect">
-            <a:avLst/>
-          </a:prstGeom>
-        </p:spPr>
-        <p:style>
-          <a:lnRef idx="2">
-            <a:schemeClr val="accent1">
-              <a:shade val="50000"/>
-            </a:schemeClr>
-          </a:lnRef>
-          <a:fillRef idx="1">
-            <a:schemeClr val="accent1"/>
-          </a:fillRef>
-          <a:effectRef idx="0">
-            <a:schemeClr val="accent1"/>
-          </a:effectRef>
-          <a:fontRef idx="minor">
-            <a:schemeClr val="lt1"/>
-          </a:fontRef>
-        </p:style>
-        <p:txBody>
-          <a:bodyPr rtlCol="0" anchor="ctr"/>
-          <a:lstStyle/>
-          <a:p>
-            <a:pPr algn="ctr"/>
-            <a:endParaRPr lang="fr-FR"/>
-          </a:p>
-        </p:txBody>
-      </p:sp>
-      <p:sp>
-        <p:nvSpPr>
-          <p:cNvPr id="15" name="Rectangle 14"/>
-          <p:cNvSpPr/>
-          <p:nvPr/>
-        </p:nvSpPr>
-        <p:spPr>
-          <a:xfrm>
-            <a:off x="3714595" y="4337879"/>
-            <a:ext cx="1389856" cy="838983"/>
-          </a:xfrm>
-          <a:prstGeom prst="rect">
-            <a:avLst/>
-          </a:prstGeom>
-        </p:spPr>
-        <p:style>
-          <a:lnRef idx="2">
-            <a:schemeClr val="accent1">
-              <a:shade val="50000"/>
-            </a:schemeClr>
-          </a:lnRef>
-          <a:fillRef idx="1">
-            <a:schemeClr val="accent1"/>
-          </a:fillRef>
-          <a:effectRef idx="0">
-            <a:schemeClr val="accent1"/>
-          </a:effectRef>
-          <a:fontRef idx="minor">
-            <a:schemeClr val="lt1"/>
-          </a:fontRef>
-        </p:style>
-        <p:txBody>
-          <a:bodyPr rtlCol="0" anchor="ctr"/>
-          <a:lstStyle/>
-          <a:p>
-            <a:pPr algn="ctr"/>
-            <a:endParaRPr lang="fr-FR" dirty="0"/>
-          </a:p>
-        </p:txBody>
-      </p:sp>
-      <p:sp>
-        <p:nvSpPr>
-          <p:cNvPr id="16" name="ZoneTexte 15"/>
-          <p:cNvSpPr txBox="1"/>
-          <p:nvPr/>
-        </p:nvSpPr>
-        <p:spPr>
-          <a:xfrm>
-            <a:off x="2841340" y="5157192"/>
-            <a:ext cx="3821360" cy="369332"/>
-          </a:xfrm>
-          <a:prstGeom prst="rect">
-            <a:avLst/>
-          </a:prstGeom>
-          <a:noFill/>
-        </p:spPr>
-        <p:txBody>
-          <a:bodyPr wrap="square" rtlCol="0">
-            <a:spAutoFit/>
-          </a:bodyPr>
-          <a:lstStyle/>
-          <a:p>
-            <a:r>
-              <a:rPr lang="fr-FR" dirty="0" smtClean="0"/>
-              <a:t>3 </a:t>
-            </a:r>
-            <a:r>
-              <a:rPr lang="fr-FR" dirty="0" err="1" smtClean="0"/>
-              <a:t>ième</a:t>
-            </a:r>
-            <a:r>
-              <a:rPr lang="fr-FR" dirty="0" smtClean="0"/>
-              <a:t> présentation  devant le gardien</a:t>
-            </a:r>
-            <a:endParaRPr lang="fr-FR" dirty="0"/>
-          </a:p>
-        </p:txBody>
-      </p:sp>
-      <p:sp>
-        <p:nvSpPr>
-          <p:cNvPr id="17" name="Rectangle 16"/>
-          <p:cNvSpPr/>
-          <p:nvPr/>
-        </p:nvSpPr>
-        <p:spPr>
-          <a:xfrm>
-            <a:off x="3040151" y="5733256"/>
-            <a:ext cx="1224136" cy="648072"/>
-          </a:xfrm>
-          <a:prstGeom prst="rect">
-            <a:avLst/>
-          </a:prstGeom>
-        </p:spPr>
-        <p:style>
-          <a:lnRef idx="2">
-            <a:schemeClr val="accent1">
-              <a:shade val="50000"/>
-            </a:schemeClr>
-          </a:lnRef>
-          <a:fillRef idx="1">
-            <a:schemeClr val="accent1"/>
-          </a:fillRef>
-          <a:effectRef idx="0">
-            <a:schemeClr val="accent1"/>
-          </a:effectRef>
-          <a:fontRef idx="minor">
-            <a:schemeClr val="lt1"/>
-          </a:fontRef>
-        </p:style>
-        <p:txBody>
-          <a:bodyPr rtlCol="0" anchor="ctr"/>
-          <a:lstStyle/>
-          <a:p>
-            <a:pPr algn="ctr"/>
-            <a:endParaRPr lang="fr-FR"/>
-          </a:p>
-        </p:txBody>
-      </p:sp>
-      <p:sp>
-        <p:nvSpPr>
-          <p:cNvPr id="18" name="Rectangle 17"/>
-          <p:cNvSpPr/>
-          <p:nvPr/>
-        </p:nvSpPr>
-        <p:spPr>
-          <a:xfrm>
-            <a:off x="5335488" y="5733256"/>
-            <a:ext cx="1224136" cy="648072"/>
-          </a:xfrm>
-          <a:prstGeom prst="rect">
-            <a:avLst/>
-          </a:prstGeom>
-        </p:spPr>
-        <p:style>
-          <a:lnRef idx="2">
-            <a:schemeClr val="accent1">
-              <a:shade val="50000"/>
-            </a:schemeClr>
-          </a:lnRef>
-          <a:fillRef idx="1">
-            <a:schemeClr val="accent1"/>
-          </a:fillRef>
-          <a:effectRef idx="0">
-            <a:schemeClr val="accent1"/>
-          </a:effectRef>
-          <a:fontRef idx="minor">
-            <a:schemeClr val="lt1"/>
-          </a:fontRef>
-        </p:style>
-        <p:txBody>
-          <a:bodyPr rtlCol="0" anchor="ctr"/>
-          <a:lstStyle/>
-          <a:p>
-            <a:pPr algn="ctr"/>
-            <a:endParaRPr lang="fr-FR"/>
-          </a:p>
-        </p:txBody>
-      </p:sp>
-      <p:sp>
-        <p:nvSpPr>
-          <p:cNvPr id="19" name="ZoneTexte 18"/>
-          <p:cNvSpPr txBox="1"/>
-          <p:nvPr/>
-        </p:nvSpPr>
-        <p:spPr>
-          <a:xfrm>
-            <a:off x="5335488" y="2069896"/>
-            <a:ext cx="892696" cy="600164"/>
-          </a:xfrm>
-          <a:prstGeom prst="rect">
-            <a:avLst/>
-          </a:prstGeom>
-          <a:noFill/>
-        </p:spPr>
-        <p:txBody>
-          <a:bodyPr wrap="square" rtlCol="0">
-            <a:spAutoFit/>
-          </a:bodyPr>
-          <a:lstStyle/>
-          <a:p>
-            <a:r>
-              <a:rPr lang="fr-FR" sz="1100" dirty="0" smtClean="0"/>
-              <a:t>6 Objets ramassés, Victoire</a:t>
-            </a:r>
-            <a:endParaRPr lang="fr-FR" sz="1100" dirty="0"/>
-          </a:p>
-        </p:txBody>
-      </p:sp>
-      <p:sp>
-        <p:nvSpPr>
-          <p:cNvPr id="20" name="ZoneTexte 19"/>
-          <p:cNvSpPr txBox="1"/>
-          <p:nvPr/>
-        </p:nvSpPr>
-        <p:spPr>
-          <a:xfrm>
-            <a:off x="2957647" y="2045942"/>
-            <a:ext cx="1224136" cy="600164"/>
-          </a:xfrm>
-          <a:prstGeom prst="rect">
-            <a:avLst/>
-          </a:prstGeom>
-          <a:noFill/>
-        </p:spPr>
-        <p:txBody>
-          <a:bodyPr wrap="square" rtlCol="0">
-            <a:spAutoFit/>
-          </a:bodyPr>
-          <a:lstStyle/>
-          <a:p>
-            <a:r>
-              <a:rPr lang="fr-FR" sz="1100" dirty="0" smtClean="0"/>
-              <a:t>Inferieure à 6 Objets ramassés, Gardien en colère</a:t>
-            </a:r>
-            <a:endParaRPr lang="fr-FR" sz="1100" dirty="0"/>
-          </a:p>
-        </p:txBody>
-      </p:sp>
-      <p:sp>
-        <p:nvSpPr>
-          <p:cNvPr id="21" name="ZoneTexte 20"/>
-          <p:cNvSpPr txBox="1"/>
-          <p:nvPr/>
-        </p:nvSpPr>
-        <p:spPr>
-          <a:xfrm>
-            <a:off x="5487888" y="3565465"/>
-            <a:ext cx="892696" cy="600164"/>
-          </a:xfrm>
-          <a:prstGeom prst="rect">
-            <a:avLst/>
-          </a:prstGeom>
-          <a:noFill/>
-        </p:spPr>
-        <p:txBody>
-          <a:bodyPr wrap="square" rtlCol="0">
-            <a:spAutoFit/>
-          </a:bodyPr>
-          <a:lstStyle/>
-          <a:p>
-            <a:r>
-              <a:rPr lang="fr-FR" sz="1100" dirty="0" smtClean="0"/>
-              <a:t>6 Objets ramassés, Victoire</a:t>
-            </a:r>
-            <a:endParaRPr lang="fr-FR" sz="1100" dirty="0"/>
-          </a:p>
-        </p:txBody>
-      </p:sp>
-      <p:sp>
-        <p:nvSpPr>
-          <p:cNvPr id="22" name="ZoneTexte 21"/>
-          <p:cNvSpPr txBox="1"/>
-          <p:nvPr/>
-        </p:nvSpPr>
-        <p:spPr>
-          <a:xfrm>
-            <a:off x="5479504" y="5757210"/>
-            <a:ext cx="892696" cy="600164"/>
-          </a:xfrm>
-          <a:prstGeom prst="rect">
-            <a:avLst/>
-          </a:prstGeom>
-          <a:noFill/>
-        </p:spPr>
-        <p:txBody>
-          <a:bodyPr wrap="square" rtlCol="0">
-            <a:spAutoFit/>
-          </a:bodyPr>
-          <a:lstStyle/>
-          <a:p>
-            <a:r>
-              <a:rPr lang="fr-FR" sz="1100" dirty="0" smtClean="0"/>
-              <a:t>6 Objets ramassés, Victoire</a:t>
-            </a:r>
-            <a:endParaRPr lang="fr-FR" sz="1100" dirty="0"/>
-          </a:p>
-        </p:txBody>
-      </p:sp>
-      <p:sp>
-        <p:nvSpPr>
-          <p:cNvPr id="25" name="ZoneTexte 24"/>
-          <p:cNvSpPr txBox="1"/>
-          <p:nvPr/>
-        </p:nvSpPr>
-        <p:spPr>
-          <a:xfrm>
-            <a:off x="2987824" y="3565465"/>
-            <a:ext cx="1224136" cy="430887"/>
-          </a:xfrm>
-          <a:prstGeom prst="rect">
-            <a:avLst/>
-          </a:prstGeom>
-          <a:noFill/>
-        </p:spPr>
-        <p:txBody>
-          <a:bodyPr wrap="square" rtlCol="0">
-            <a:spAutoFit/>
-          </a:bodyPr>
-          <a:lstStyle/>
-          <a:p>
-            <a:r>
-              <a:rPr lang="fr-FR" sz="1100" dirty="0" smtClean="0"/>
-              <a:t>Inferieure à 6 Objets ramassés, </a:t>
-            </a:r>
-            <a:endParaRPr lang="fr-FR" sz="1100" dirty="0"/>
-          </a:p>
-        </p:txBody>
-      </p:sp>
-      <p:sp>
-        <p:nvSpPr>
-          <p:cNvPr id="26" name="ZoneTexte 25"/>
-          <p:cNvSpPr txBox="1"/>
-          <p:nvPr/>
-        </p:nvSpPr>
-        <p:spPr>
-          <a:xfrm>
-            <a:off x="2119416" y="4357552"/>
-            <a:ext cx="1431152" cy="938719"/>
-          </a:xfrm>
-          <a:prstGeom prst="rect">
-            <a:avLst/>
-          </a:prstGeom>
-          <a:noFill/>
-        </p:spPr>
-        <p:txBody>
-          <a:bodyPr wrap="square" rtlCol="0">
-            <a:spAutoFit/>
-          </a:bodyPr>
-          <a:lstStyle/>
-          <a:p>
-            <a:r>
-              <a:rPr lang="fr-FR" sz="1100" dirty="0" smtClean="0"/>
-              <a:t>Objets ramassés &gt; Objets ramassés  précédemment </a:t>
-            </a:r>
-          </a:p>
-          <a:p>
-            <a:r>
-              <a:rPr lang="fr-FR" sz="1100" dirty="0" smtClean="0"/>
-              <a:t>Gardien en colère</a:t>
-            </a:r>
-          </a:p>
-          <a:p>
-            <a:endParaRPr lang="fr-FR" sz="1100" dirty="0"/>
-          </a:p>
-        </p:txBody>
-      </p:sp>
-      <p:sp>
-        <p:nvSpPr>
-          <p:cNvPr id="27" name="ZoneTexte 26"/>
-          <p:cNvSpPr txBox="1"/>
-          <p:nvPr/>
-        </p:nvSpPr>
-        <p:spPr>
-          <a:xfrm>
-            <a:off x="3714595" y="4337879"/>
-            <a:ext cx="1495845" cy="938719"/>
-          </a:xfrm>
-          <a:prstGeom prst="rect">
-            <a:avLst/>
-          </a:prstGeom>
-          <a:noFill/>
-        </p:spPr>
-        <p:txBody>
-          <a:bodyPr wrap="square" rtlCol="0">
-            <a:spAutoFit/>
-          </a:bodyPr>
-          <a:lstStyle/>
-          <a:p>
-            <a:r>
-              <a:rPr lang="fr-FR" sz="1100" dirty="0" smtClean="0"/>
-              <a:t>Objets ramassés = Objets ramassés  précédemment </a:t>
-            </a:r>
-          </a:p>
-          <a:p>
-            <a:r>
-              <a:rPr lang="fr-FR" sz="1100" dirty="0" smtClean="0"/>
-              <a:t>Gardien très en colère</a:t>
-            </a:r>
-          </a:p>
-          <a:p>
-            <a:endParaRPr lang="fr-FR" sz="1100" dirty="0"/>
-          </a:p>
-        </p:txBody>
-      </p:sp>
-      <p:sp>
-        <p:nvSpPr>
-          <p:cNvPr id="28" name="ZoneTexte 27"/>
-          <p:cNvSpPr txBox="1"/>
-          <p:nvPr/>
-        </p:nvSpPr>
-        <p:spPr>
-          <a:xfrm>
-            <a:off x="3040418" y="5733256"/>
-            <a:ext cx="1224136" cy="600164"/>
-          </a:xfrm>
-          <a:prstGeom prst="rect">
-            <a:avLst/>
-          </a:prstGeom>
-          <a:noFill/>
-        </p:spPr>
-        <p:txBody>
-          <a:bodyPr wrap="square" rtlCol="0">
-            <a:spAutoFit/>
-          </a:bodyPr>
-          <a:lstStyle/>
-          <a:p>
-            <a:r>
-              <a:rPr lang="fr-FR" sz="1100" dirty="0" smtClean="0"/>
-              <a:t>Inferieure à 6 Objets ramassés, Perdu</a:t>
-            </a:r>
-            <a:endParaRPr lang="fr-FR" sz="1100" dirty="0"/>
-          </a:p>
-        </p:txBody>
-      </p:sp>
+      </p:pic>
     </p:spTree>
     <p:extLst>
       <p:ext uri="{BB962C8B-B14F-4D97-AF65-F5344CB8AC3E}">
-        <p14:creationId xmlns:p14="http://schemas.microsoft.com/office/powerpoint/2010/main" val="2051978740"/>
+        <p14:creationId xmlns:p14="http://schemas.microsoft.com/office/powerpoint/2010/main" val="2585976212"/>
       </p:ext>
     </p:extLst>
   </p:cSld>

</xml_diff>